<commit_message>
Added l_i values to Fig1a
</commit_message>
<xml_diff>
--- a/figures/model_figures.pptx
+++ b/figures/model_figures.pptx
@@ -278,7 +278,7 @@
           <a:p>
             <a:fld id="{14AB990E-AD98-CD44-AFF8-DD4A87834CE8}" type="datetimeFigureOut">
               <a:rPr lang="en-US" smtClean="0"/>
-              <a:t>10/24/16</a:t>
+              <a:t>9/18/17</a:t>
             </a:fld>
             <a:endParaRPr lang="en-US"/>
           </a:p>
@@ -448,7 +448,7 @@
           <a:p>
             <a:fld id="{14AB990E-AD98-CD44-AFF8-DD4A87834CE8}" type="datetimeFigureOut">
               <a:rPr lang="en-US" smtClean="0"/>
-              <a:t>10/24/16</a:t>
+              <a:t>9/18/17</a:t>
             </a:fld>
             <a:endParaRPr lang="en-US"/>
           </a:p>
@@ -628,7 +628,7 @@
           <a:p>
             <a:fld id="{14AB990E-AD98-CD44-AFF8-DD4A87834CE8}" type="datetimeFigureOut">
               <a:rPr lang="en-US" smtClean="0"/>
-              <a:t>10/24/16</a:t>
+              <a:t>9/18/17</a:t>
             </a:fld>
             <a:endParaRPr lang="en-US"/>
           </a:p>
@@ -798,7 +798,7 @@
           <a:p>
             <a:fld id="{14AB990E-AD98-CD44-AFF8-DD4A87834CE8}" type="datetimeFigureOut">
               <a:rPr lang="en-US" smtClean="0"/>
-              <a:t>10/24/16</a:t>
+              <a:t>9/18/17</a:t>
             </a:fld>
             <a:endParaRPr lang="en-US"/>
           </a:p>
@@ -1044,7 +1044,7 @@
           <a:p>
             <a:fld id="{14AB990E-AD98-CD44-AFF8-DD4A87834CE8}" type="datetimeFigureOut">
               <a:rPr lang="en-US" smtClean="0"/>
-              <a:t>10/24/16</a:t>
+              <a:t>9/18/17</a:t>
             </a:fld>
             <a:endParaRPr lang="en-US"/>
           </a:p>
@@ -1276,7 +1276,7 @@
           <a:p>
             <a:fld id="{14AB990E-AD98-CD44-AFF8-DD4A87834CE8}" type="datetimeFigureOut">
               <a:rPr lang="en-US" smtClean="0"/>
-              <a:t>10/24/16</a:t>
+              <a:t>9/18/17</a:t>
             </a:fld>
             <a:endParaRPr lang="en-US"/>
           </a:p>
@@ -1643,7 +1643,7 @@
           <a:p>
             <a:fld id="{14AB990E-AD98-CD44-AFF8-DD4A87834CE8}" type="datetimeFigureOut">
               <a:rPr lang="en-US" smtClean="0"/>
-              <a:t>10/24/16</a:t>
+              <a:t>9/18/17</a:t>
             </a:fld>
             <a:endParaRPr lang="en-US"/>
           </a:p>
@@ -1761,7 +1761,7 @@
           <a:p>
             <a:fld id="{14AB990E-AD98-CD44-AFF8-DD4A87834CE8}" type="datetimeFigureOut">
               <a:rPr lang="en-US" smtClean="0"/>
-              <a:t>10/24/16</a:t>
+              <a:t>9/18/17</a:t>
             </a:fld>
             <a:endParaRPr lang="en-US"/>
           </a:p>
@@ -1856,7 +1856,7 @@
           <a:p>
             <a:fld id="{14AB990E-AD98-CD44-AFF8-DD4A87834CE8}" type="datetimeFigureOut">
               <a:rPr lang="en-US" smtClean="0"/>
-              <a:t>10/24/16</a:t>
+              <a:t>9/18/17</a:t>
             </a:fld>
             <a:endParaRPr lang="en-US"/>
           </a:p>
@@ -2133,7 +2133,7 @@
           <a:p>
             <a:fld id="{14AB990E-AD98-CD44-AFF8-DD4A87834CE8}" type="datetimeFigureOut">
               <a:rPr lang="en-US" smtClean="0"/>
-              <a:t>10/24/16</a:t>
+              <a:t>9/18/17</a:t>
             </a:fld>
             <a:endParaRPr lang="en-US"/>
           </a:p>
@@ -2386,7 +2386,7 @@
           <a:p>
             <a:fld id="{14AB990E-AD98-CD44-AFF8-DD4A87834CE8}" type="datetimeFigureOut">
               <a:rPr lang="en-US" smtClean="0"/>
-              <a:t>10/24/16</a:t>
+              <a:t>9/18/17</a:t>
             </a:fld>
             <a:endParaRPr lang="en-US"/>
           </a:p>
@@ -2599,7 +2599,7 @@
           <a:p>
             <a:fld id="{14AB990E-AD98-CD44-AFF8-DD4A87834CE8}" type="datetimeFigureOut">
               <a:rPr lang="en-US" smtClean="0"/>
-              <a:t>10/24/16</a:t>
+              <a:t>9/18/17</a:t>
             </a:fld>
             <a:endParaRPr lang="en-US"/>
           </a:p>
@@ -3012,10 +3012,10 @@
         </p:nvGrpSpPr>
         <p:grpSpPr>
           <a:xfrm>
-            <a:off x="2011948" y="1400505"/>
-            <a:ext cx="7937370" cy="2958077"/>
+            <a:off x="589548" y="762000"/>
+            <a:ext cx="10827752" cy="4368260"/>
             <a:chOff x="2011948" y="1400505"/>
-            <a:chExt cx="7937370" cy="2958077"/>
+            <a:chExt cx="7937370" cy="2956031"/>
           </a:xfrm>
         </p:grpSpPr>
         <p:cxnSp>
@@ -3375,8 +3375,8 @@
             </a:fontRef>
           </p:style>
         </p:cxnSp>
-        <mc:AlternateContent xmlns:mc="http://schemas.openxmlformats.org/markup-compatibility/2006" xmlns:a14="http://schemas.microsoft.com/office/drawing/2010/main">
-          <mc:Choice Requires="a14">
+        <mc:AlternateContent xmlns:mc="http://schemas.openxmlformats.org/markup-compatibility/2006">
+          <mc:Choice xmlns:a14="http://schemas.microsoft.com/office/drawing/2010/main" Requires="a14">
             <p:sp>
               <p:nvSpPr>
                 <p:cNvPr id="31" name="TextBox 30"/>
@@ -3385,7 +3385,7 @@
               </p:nvSpPr>
               <p:spPr>
                 <a:xfrm>
-                  <a:off x="5041145" y="1547458"/>
+                  <a:off x="5149154" y="1555183"/>
                   <a:ext cx="329642" cy="307777"/>
                 </a:xfrm>
                 <a:prstGeom prst="rect">
@@ -3452,7 +3452,7 @@
               </p:txBody>
             </p:sp>
           </mc:Choice>
-          <mc:Fallback xmlns="">
+          <mc:Fallback>
             <p:sp>
               <p:nvSpPr>
                 <p:cNvPr id="31" name="TextBox 30"/>
@@ -3463,7 +3463,7 @@
               </p:nvSpPr>
               <p:spPr>
                 <a:xfrm>
-                  <a:off x="5041145" y="1547458"/>
+                  <a:off x="5149154" y="1555183"/>
                   <a:ext cx="329642" cy="307777"/>
                 </a:xfrm>
                 <a:prstGeom prst="rect">
@@ -3472,7 +3472,7 @@
                 <a:blipFill rotWithShape="0">
                   <a:blip r:embed="rId2"/>
                   <a:stretch>
-                    <a:fillRect l="-20370" r="-3704" b="-14000"/>
+                    <a:fillRect l="-1351"/>
                   </a:stretch>
                 </a:blipFill>
               </p:spPr>
@@ -3491,8 +3491,8 @@
             </p:sp>
           </mc:Fallback>
         </mc:AlternateContent>
-        <mc:AlternateContent xmlns:mc="http://schemas.openxmlformats.org/markup-compatibility/2006" xmlns:a14="http://schemas.microsoft.com/office/drawing/2010/main">
-          <mc:Choice Requires="a14">
+        <mc:AlternateContent xmlns:mc="http://schemas.openxmlformats.org/markup-compatibility/2006">
+          <mc:Choice xmlns:a14="http://schemas.microsoft.com/office/drawing/2010/main" Requires="a14">
             <p:sp>
               <p:nvSpPr>
                 <p:cNvPr id="32" name="TextBox 31"/>
@@ -3501,7 +3501,7 @@
               </p:nvSpPr>
               <p:spPr>
                 <a:xfrm>
-                  <a:off x="6393481" y="1547458"/>
+                  <a:off x="6354159" y="1556010"/>
                   <a:ext cx="329642" cy="307777"/>
                 </a:xfrm>
                 <a:prstGeom prst="rect">
@@ -3568,7 +3568,7 @@
               </p:txBody>
             </p:sp>
           </mc:Choice>
-          <mc:Fallback xmlns="">
+          <mc:Fallback>
             <p:sp>
               <p:nvSpPr>
                 <p:cNvPr id="32" name="TextBox 31"/>
@@ -3579,7 +3579,7 @@
               </p:nvSpPr>
               <p:spPr>
                 <a:xfrm>
-                  <a:off x="6393481" y="1547458"/>
+                  <a:off x="6354159" y="1556010"/>
                   <a:ext cx="329642" cy="307777"/>
                 </a:xfrm>
                 <a:prstGeom prst="rect">
@@ -3588,7 +3588,7 @@
                 <a:blipFill rotWithShape="0">
                   <a:blip r:embed="rId3"/>
                   <a:stretch>
-                    <a:fillRect l="-20370" r="-9259" b="-18000"/>
+                    <a:fillRect/>
                   </a:stretch>
                 </a:blipFill>
               </p:spPr>
@@ -3737,7 +3737,7 @@
           <p:spPr>
             <a:xfrm>
               <a:off x="5805680" y="1434665"/>
-              <a:ext cx="223284" cy="400110"/>
+              <a:ext cx="223284" cy="270757"/>
             </a:xfrm>
             <a:prstGeom prst="rect">
               <a:avLst/>
@@ -3752,10 +3752,18 @@
             <a:p>
               <a:pPr algn="ctr"/>
               <a:r>
-                <a:rPr lang="en-US" sz="2000" dirty="0" smtClean="0"/>
+                <a:rPr lang="en-US" sz="2000" dirty="0" smtClean="0">
+                  <a:latin typeface="Cambria Math" charset="0"/>
+                  <a:ea typeface="Cambria Math" charset="0"/>
+                  <a:cs typeface="Cambria Math" charset="0"/>
+                </a:rPr>
                 <a:t>0</a:t>
               </a:r>
-              <a:endParaRPr lang="en-US" sz="2000" dirty="0"/>
+              <a:endParaRPr lang="en-US" sz="2000" dirty="0">
+                <a:latin typeface="Cambria Math" charset="0"/>
+                <a:ea typeface="Cambria Math" charset="0"/>
+                <a:cs typeface="Cambria Math" charset="0"/>
+              </a:endParaRPr>
             </a:p>
           </p:txBody>
         </p:sp>
@@ -3768,7 +3776,7 @@
           <p:spPr>
             <a:xfrm>
               <a:off x="6446690" y="2040168"/>
-              <a:ext cx="223284" cy="400110"/>
+              <a:ext cx="223284" cy="270757"/>
             </a:xfrm>
             <a:prstGeom prst="rect">
               <a:avLst/>
@@ -3783,10 +3791,18 @@
             <a:p>
               <a:pPr algn="ctr"/>
               <a:r>
-                <a:rPr lang="en-US" sz="2000" dirty="0" smtClean="0"/>
+                <a:rPr lang="en-US" sz="2000" dirty="0" smtClean="0">
+                  <a:latin typeface="Cambria Math" charset="0"/>
+                  <a:ea typeface="Cambria Math" charset="0"/>
+                  <a:cs typeface="Cambria Math" charset="0"/>
+                </a:rPr>
                 <a:t>1</a:t>
               </a:r>
-              <a:endParaRPr lang="en-US" sz="2000" dirty="0"/>
+              <a:endParaRPr lang="en-US" sz="2000" dirty="0">
+                <a:latin typeface="Cambria Math" charset="0"/>
+                <a:ea typeface="Cambria Math" charset="0"/>
+                <a:cs typeface="Cambria Math" charset="0"/>
+              </a:endParaRPr>
             </a:p>
           </p:txBody>
         </p:sp>
@@ -3799,7 +3815,7 @@
           <p:spPr>
             <a:xfrm>
               <a:off x="7072638" y="2689915"/>
-              <a:ext cx="223284" cy="400110"/>
+              <a:ext cx="223284" cy="270757"/>
             </a:xfrm>
             <a:prstGeom prst="rect">
               <a:avLst/>
@@ -3814,10 +3830,18 @@
             <a:p>
               <a:pPr algn="ctr"/>
               <a:r>
-                <a:rPr lang="en-US" sz="2000" dirty="0" smtClean="0"/>
+                <a:rPr lang="en-US" sz="2000" dirty="0" smtClean="0">
+                  <a:latin typeface="Cambria Math" charset="0"/>
+                  <a:ea typeface="Cambria Math" charset="0"/>
+                  <a:cs typeface="Cambria Math" charset="0"/>
+                </a:rPr>
                 <a:t>2</a:t>
               </a:r>
-              <a:endParaRPr lang="en-US" sz="2000" dirty="0"/>
+              <a:endParaRPr lang="en-US" sz="2000" dirty="0">
+                <a:latin typeface="Cambria Math" charset="0"/>
+                <a:ea typeface="Cambria Math" charset="0"/>
+                <a:cs typeface="Cambria Math" charset="0"/>
+              </a:endParaRPr>
             </a:p>
           </p:txBody>
         </p:sp>
@@ -3830,7 +3854,7 @@
           <p:spPr>
             <a:xfrm>
               <a:off x="6295696" y="3431632"/>
-              <a:ext cx="223284" cy="400110"/>
+              <a:ext cx="223284" cy="270757"/>
             </a:xfrm>
             <a:prstGeom prst="rect">
               <a:avLst/>
@@ -3845,10 +3869,18 @@
             <a:p>
               <a:pPr algn="ctr"/>
               <a:r>
-                <a:rPr lang="en-US" sz="2000" dirty="0" smtClean="0"/>
+                <a:rPr lang="en-US" sz="2000" dirty="0" smtClean="0">
+                  <a:latin typeface="Cambria Math" charset="0"/>
+                  <a:ea typeface="Cambria Math" charset="0"/>
+                  <a:cs typeface="Cambria Math" charset="0"/>
+                </a:rPr>
                 <a:t>3</a:t>
               </a:r>
-              <a:endParaRPr lang="en-US" sz="2000" dirty="0"/>
+              <a:endParaRPr lang="en-US" sz="2000" dirty="0">
+                <a:latin typeface="Cambria Math" charset="0"/>
+                <a:ea typeface="Cambria Math" charset="0"/>
+                <a:cs typeface="Cambria Math" charset="0"/>
+              </a:endParaRPr>
             </a:p>
           </p:txBody>
         </p:sp>
@@ -4457,7 +4489,7 @@
           <p:spPr>
             <a:xfrm>
               <a:off x="5749861" y="3958472"/>
-              <a:ext cx="223284" cy="400110"/>
+              <a:ext cx="223284" cy="270757"/>
             </a:xfrm>
             <a:prstGeom prst="rect">
               <a:avLst/>
@@ -4472,10 +4504,18 @@
             <a:p>
               <a:pPr algn="ctr"/>
               <a:r>
-                <a:rPr lang="en-US" sz="2000" dirty="0" smtClean="0"/>
+                <a:rPr lang="en-US" sz="2000" dirty="0" smtClean="0">
+                  <a:latin typeface="Cambria Math" charset="0"/>
+                  <a:ea typeface="Cambria Math" charset="0"/>
+                  <a:cs typeface="Cambria Math" charset="0"/>
+                </a:rPr>
                 <a:t>4</a:t>
               </a:r>
-              <a:endParaRPr lang="en-US" sz="2000" dirty="0"/>
+              <a:endParaRPr lang="en-US" sz="2000" dirty="0">
+                <a:latin typeface="Cambria Math" charset="0"/>
+                <a:ea typeface="Cambria Math" charset="0"/>
+                <a:cs typeface="Cambria Math" charset="0"/>
+              </a:endParaRPr>
             </a:p>
           </p:txBody>
         </p:sp>
@@ -4656,6 +4696,586 @@
           </mc:Fallback>
         </mc:AlternateContent>
       </p:grpSp>
+      <mc:AlternateContent xmlns:mc="http://schemas.openxmlformats.org/markup-compatibility/2006">
+        <mc:Choice xmlns:a14="http://schemas.microsoft.com/office/drawing/2010/main" Requires="a14">
+          <p:sp>
+            <p:nvSpPr>
+              <p:cNvPr id="3" name="TextBox 2"/>
+              <p:cNvSpPr txBox="1"/>
+              <p:nvPr/>
+            </p:nvSpPr>
+            <p:spPr>
+              <a:xfrm>
+                <a:off x="6108475" y="681716"/>
+                <a:ext cx="685800" cy="369332"/>
+              </a:xfrm>
+              <a:prstGeom prst="rect">
+                <a:avLst/>
+              </a:prstGeom>
+              <a:noFill/>
+            </p:spPr>
+            <p:txBody>
+              <a:bodyPr wrap="square" rtlCol="0">
+                <a:spAutoFit/>
+              </a:bodyPr>
+              <a:lstStyle/>
+              <a:p>
+                <a:pPr algn="ctr"/>
+                <a14:m>
+                  <m:oMath xmlns:m="http://schemas.openxmlformats.org/officeDocument/2006/math">
+                    <m:sSub>
+                      <m:sSubPr>
+                        <m:ctrlPr>
+                          <a:rPr lang="en-US" b="0" i="1" smtClean="0">
+                            <a:latin typeface="Cambria Math" charset="0"/>
+                            <a:ea typeface="Cambria Math" charset="0"/>
+                            <a:cs typeface="Cambria Math" charset="0"/>
+                          </a:rPr>
+                        </m:ctrlPr>
+                      </m:sSubPr>
+                      <m:e>
+                        <m:r>
+                          <a:rPr lang="en-US" b="0" i="1" smtClean="0">
+                            <a:latin typeface="Cambria Math" charset="0"/>
+                            <a:ea typeface="Cambria Math" charset="0"/>
+                            <a:cs typeface="Cambria Math" charset="0"/>
+                          </a:rPr>
+                          <m:t>𝑙</m:t>
+                        </m:r>
+                      </m:e>
+                      <m:sub>
+                        <m:r>
+                          <a:rPr lang="en-US" b="0" i="1" smtClean="0">
+                            <a:latin typeface="Cambria Math" charset="0"/>
+                            <a:ea typeface="Cambria Math" charset="0"/>
+                            <a:cs typeface="Cambria Math" charset="0"/>
+                          </a:rPr>
+                          <m:t>0</m:t>
+                        </m:r>
+                      </m:sub>
+                    </m:sSub>
+                  </m:oMath>
+                </a14:m>
+                <a:r>
+                  <a:rPr lang="en-US" dirty="0" smtClean="0">
+                    <a:latin typeface="Cambria Math" charset="0"/>
+                    <a:ea typeface="Cambria Math" charset="0"/>
+                    <a:cs typeface="Cambria Math" charset="0"/>
+                  </a:rPr>
+                  <a:t>=0</a:t>
+                </a:r>
+                <a:endParaRPr lang="en-US" dirty="0">
+                  <a:latin typeface="Cambria Math" charset="0"/>
+                  <a:ea typeface="Cambria Math" charset="0"/>
+                  <a:cs typeface="Cambria Math" charset="0"/>
+                </a:endParaRPr>
+              </a:p>
+            </p:txBody>
+          </p:sp>
+        </mc:Choice>
+        <mc:Fallback>
+          <p:sp>
+            <p:nvSpPr>
+              <p:cNvPr id="3" name="TextBox 2"/>
+              <p:cNvSpPr txBox="1">
+                <a:spLocks noRot="1" noChangeAspect="1" noMove="1" noResize="1" noEditPoints="1" noAdjustHandles="1" noChangeArrowheads="1" noChangeShapeType="1" noTextEdit="1"/>
+              </p:cNvSpPr>
+              <p:nvPr/>
+            </p:nvSpPr>
+            <p:spPr>
+              <a:xfrm>
+                <a:off x="6108475" y="681716"/>
+                <a:ext cx="685800" cy="369332"/>
+              </a:xfrm>
+              <a:prstGeom prst="rect">
+                <a:avLst/>
+              </a:prstGeom>
+              <a:blipFill rotWithShape="0">
+                <a:blip r:embed="rId10"/>
+                <a:stretch>
+                  <a:fillRect t="-11667" r="-5310" b="-25000"/>
+                </a:stretch>
+              </a:blipFill>
+            </p:spPr>
+            <p:txBody>
+              <a:bodyPr/>
+              <a:lstStyle/>
+              <a:p>
+                <a:r>
+                  <a:rPr lang="en-US">
+                    <a:noFill/>
+                  </a:rPr>
+                  <a:t> </a:t>
+                </a:r>
+              </a:p>
+            </p:txBody>
+          </p:sp>
+        </mc:Fallback>
+      </mc:AlternateContent>
+      <mc:AlternateContent xmlns:mc="http://schemas.openxmlformats.org/markup-compatibility/2006">
+        <mc:Choice xmlns:a14="http://schemas.microsoft.com/office/drawing/2010/main" Requires="a14">
+          <p:sp>
+            <p:nvSpPr>
+              <p:cNvPr id="50" name="TextBox 49"/>
+              <p:cNvSpPr txBox="1"/>
+              <p:nvPr/>
+            </p:nvSpPr>
+            <p:spPr>
+              <a:xfrm>
+                <a:off x="6964208" y="1606932"/>
+                <a:ext cx="685800" cy="369332"/>
+              </a:xfrm>
+              <a:prstGeom prst="rect">
+                <a:avLst/>
+              </a:prstGeom>
+              <a:noFill/>
+            </p:spPr>
+            <p:txBody>
+              <a:bodyPr wrap="square" rtlCol="0">
+                <a:spAutoFit/>
+              </a:bodyPr>
+              <a:lstStyle/>
+              <a:p>
+                <a:pPr algn="ctr"/>
+                <a14:m>
+                  <m:oMath xmlns:m="http://schemas.openxmlformats.org/officeDocument/2006/math">
+                    <m:sSub>
+                      <m:sSubPr>
+                        <m:ctrlPr>
+                          <a:rPr lang="en-US" b="0" i="1" smtClean="0">
+                            <a:latin typeface="Cambria Math" charset="0"/>
+                            <a:ea typeface="Cambria Math" charset="0"/>
+                            <a:cs typeface="Cambria Math" charset="0"/>
+                          </a:rPr>
+                        </m:ctrlPr>
+                      </m:sSubPr>
+                      <m:e>
+                        <m:r>
+                          <a:rPr lang="en-US" b="0" i="1" smtClean="0">
+                            <a:latin typeface="Cambria Math" charset="0"/>
+                            <a:ea typeface="Cambria Math" charset="0"/>
+                            <a:cs typeface="Cambria Math" charset="0"/>
+                          </a:rPr>
+                          <m:t>𝑙</m:t>
+                        </m:r>
+                      </m:e>
+                      <m:sub>
+                        <m:r>
+                          <a:rPr lang="en-US" b="0" i="1" smtClean="0">
+                            <a:latin typeface="Cambria Math" charset="0"/>
+                            <a:ea typeface="Cambria Math" charset="0"/>
+                            <a:cs typeface="Cambria Math" charset="0"/>
+                          </a:rPr>
+                          <m:t>1</m:t>
+                        </m:r>
+                      </m:sub>
+                    </m:sSub>
+                  </m:oMath>
+                </a14:m>
+                <a:r>
+                  <a:rPr lang="en-US" dirty="0" smtClean="0">
+                    <a:latin typeface="Cambria Math" charset="0"/>
+                    <a:ea typeface="Cambria Math" charset="0"/>
+                    <a:cs typeface="Cambria Math" charset="0"/>
+                  </a:rPr>
+                  <a:t>=1</a:t>
+                </a:r>
+                <a:endParaRPr lang="en-US" dirty="0">
+                  <a:latin typeface="Cambria Math" charset="0"/>
+                  <a:ea typeface="Cambria Math" charset="0"/>
+                  <a:cs typeface="Cambria Math" charset="0"/>
+                </a:endParaRPr>
+              </a:p>
+            </p:txBody>
+          </p:sp>
+        </mc:Choice>
+        <mc:Fallback>
+          <p:sp>
+            <p:nvSpPr>
+              <p:cNvPr id="50" name="TextBox 49"/>
+              <p:cNvSpPr txBox="1">
+                <a:spLocks noRot="1" noChangeAspect="1" noMove="1" noResize="1" noEditPoints="1" noAdjustHandles="1" noChangeArrowheads="1" noChangeShapeType="1" noTextEdit="1"/>
+              </p:cNvSpPr>
+              <p:nvPr/>
+            </p:nvSpPr>
+            <p:spPr>
+              <a:xfrm>
+                <a:off x="6964208" y="1606932"/>
+                <a:ext cx="685800" cy="369332"/>
+              </a:xfrm>
+              <a:prstGeom prst="rect">
+                <a:avLst/>
+              </a:prstGeom>
+              <a:blipFill rotWithShape="0">
+                <a:blip r:embed="rId11"/>
+                <a:stretch>
+                  <a:fillRect t="-11667" r="-4425" b="-25000"/>
+                </a:stretch>
+              </a:blipFill>
+            </p:spPr>
+            <p:txBody>
+              <a:bodyPr/>
+              <a:lstStyle/>
+              <a:p>
+                <a:r>
+                  <a:rPr lang="en-US">
+                    <a:noFill/>
+                  </a:rPr>
+                  <a:t> </a:t>
+                </a:r>
+              </a:p>
+            </p:txBody>
+          </p:sp>
+        </mc:Fallback>
+      </mc:AlternateContent>
+      <mc:AlternateContent xmlns:mc="http://schemas.openxmlformats.org/markup-compatibility/2006">
+        <mc:Choice xmlns:a14="http://schemas.microsoft.com/office/drawing/2010/main" Requires="a14">
+          <p:sp>
+            <p:nvSpPr>
+              <p:cNvPr id="51" name="TextBox 50"/>
+              <p:cNvSpPr txBox="1"/>
+              <p:nvPr/>
+            </p:nvSpPr>
+            <p:spPr>
+              <a:xfrm>
+                <a:off x="7799232" y="2520539"/>
+                <a:ext cx="685800" cy="369332"/>
+              </a:xfrm>
+              <a:prstGeom prst="rect">
+                <a:avLst/>
+              </a:prstGeom>
+              <a:noFill/>
+            </p:spPr>
+            <p:txBody>
+              <a:bodyPr wrap="square" rtlCol="0">
+                <a:spAutoFit/>
+              </a:bodyPr>
+              <a:lstStyle/>
+              <a:p>
+                <a:pPr algn="ctr"/>
+                <a14:m>
+                  <m:oMath xmlns:m="http://schemas.openxmlformats.org/officeDocument/2006/math">
+                    <m:sSub>
+                      <m:sSubPr>
+                        <m:ctrlPr>
+                          <a:rPr lang="en-US" b="0" i="1" smtClean="0">
+                            <a:latin typeface="Cambria Math" charset="0"/>
+                            <a:ea typeface="Cambria Math" charset="0"/>
+                            <a:cs typeface="Cambria Math" charset="0"/>
+                          </a:rPr>
+                        </m:ctrlPr>
+                      </m:sSubPr>
+                      <m:e>
+                        <m:r>
+                          <a:rPr lang="en-US" b="0" i="1" smtClean="0">
+                            <a:latin typeface="Cambria Math" charset="0"/>
+                            <a:ea typeface="Cambria Math" charset="0"/>
+                            <a:cs typeface="Cambria Math" charset="0"/>
+                          </a:rPr>
+                          <m:t>𝑙</m:t>
+                        </m:r>
+                      </m:e>
+                      <m:sub>
+                        <m:r>
+                          <a:rPr lang="en-US" b="0" i="1" smtClean="0">
+                            <a:latin typeface="Cambria Math" charset="0"/>
+                            <a:ea typeface="Cambria Math" charset="0"/>
+                            <a:cs typeface="Cambria Math" charset="0"/>
+                          </a:rPr>
+                          <m:t>2</m:t>
+                        </m:r>
+                      </m:sub>
+                    </m:sSub>
+                  </m:oMath>
+                </a14:m>
+                <a:r>
+                  <a:rPr lang="en-US" dirty="0" smtClean="0">
+                    <a:latin typeface="Cambria Math" charset="0"/>
+                    <a:ea typeface="Cambria Math" charset="0"/>
+                    <a:cs typeface="Cambria Math" charset="0"/>
+                  </a:rPr>
+                  <a:t>=2</a:t>
+                </a:r>
+                <a:endParaRPr lang="en-US" dirty="0">
+                  <a:latin typeface="Cambria Math" charset="0"/>
+                  <a:ea typeface="Cambria Math" charset="0"/>
+                  <a:cs typeface="Cambria Math" charset="0"/>
+                </a:endParaRPr>
+              </a:p>
+            </p:txBody>
+          </p:sp>
+        </mc:Choice>
+        <mc:Fallback>
+          <p:sp>
+            <p:nvSpPr>
+              <p:cNvPr id="51" name="TextBox 50"/>
+              <p:cNvSpPr txBox="1">
+                <a:spLocks noRot="1" noChangeAspect="1" noMove="1" noResize="1" noEditPoints="1" noAdjustHandles="1" noChangeArrowheads="1" noChangeShapeType="1" noTextEdit="1"/>
+              </p:cNvSpPr>
+              <p:nvPr/>
+            </p:nvSpPr>
+            <p:spPr>
+              <a:xfrm>
+                <a:off x="7799232" y="2520539"/>
+                <a:ext cx="685800" cy="369332"/>
+              </a:xfrm>
+              <a:prstGeom prst="rect">
+                <a:avLst/>
+              </a:prstGeom>
+              <a:blipFill rotWithShape="0">
+                <a:blip r:embed="rId12"/>
+                <a:stretch>
+                  <a:fillRect t="-9836" r="-5310" b="-22951"/>
+                </a:stretch>
+              </a:blipFill>
+            </p:spPr>
+            <p:txBody>
+              <a:bodyPr/>
+              <a:lstStyle/>
+              <a:p>
+                <a:r>
+                  <a:rPr lang="en-US">
+                    <a:noFill/>
+                  </a:rPr>
+                  <a:t> </a:t>
+                </a:r>
+              </a:p>
+            </p:txBody>
+          </p:sp>
+        </mc:Fallback>
+      </mc:AlternateContent>
+      <mc:AlternateContent xmlns:mc="http://schemas.openxmlformats.org/markup-compatibility/2006">
+        <mc:Choice xmlns:a14="http://schemas.microsoft.com/office/drawing/2010/main" Requires="a14">
+          <p:sp>
+            <p:nvSpPr>
+              <p:cNvPr id="54" name="TextBox 53"/>
+              <p:cNvSpPr txBox="1"/>
+              <p:nvPr/>
+            </p:nvSpPr>
+            <p:spPr>
+              <a:xfrm>
+                <a:off x="6750206" y="3632090"/>
+                <a:ext cx="685800" cy="369332"/>
+              </a:xfrm>
+              <a:prstGeom prst="rect">
+                <a:avLst/>
+              </a:prstGeom>
+              <a:noFill/>
+            </p:spPr>
+            <p:txBody>
+              <a:bodyPr wrap="square" rtlCol="0">
+                <a:spAutoFit/>
+              </a:bodyPr>
+              <a:lstStyle/>
+              <a:p>
+                <a:pPr algn="ctr"/>
+                <a14:m>
+                  <m:oMath xmlns:m="http://schemas.openxmlformats.org/officeDocument/2006/math">
+                    <m:sSub>
+                      <m:sSubPr>
+                        <m:ctrlPr>
+                          <a:rPr lang="en-US" b="0" i="1" smtClean="0">
+                            <a:latin typeface="Cambria Math" charset="0"/>
+                            <a:ea typeface="Cambria Math" charset="0"/>
+                            <a:cs typeface="Cambria Math" charset="0"/>
+                          </a:rPr>
+                        </m:ctrlPr>
+                      </m:sSubPr>
+                      <m:e>
+                        <m:r>
+                          <a:rPr lang="en-US" b="0" i="1" smtClean="0">
+                            <a:latin typeface="Cambria Math" charset="0"/>
+                            <a:ea typeface="Cambria Math" charset="0"/>
+                            <a:cs typeface="Cambria Math" charset="0"/>
+                          </a:rPr>
+                          <m:t>𝑙</m:t>
+                        </m:r>
+                      </m:e>
+                      <m:sub>
+                        <m:r>
+                          <a:rPr lang="en-US" b="0" i="1" smtClean="0">
+                            <a:latin typeface="Cambria Math" charset="0"/>
+                            <a:ea typeface="Cambria Math" charset="0"/>
+                            <a:cs typeface="Cambria Math" charset="0"/>
+                          </a:rPr>
+                          <m:t>3</m:t>
+                        </m:r>
+                      </m:sub>
+                    </m:sSub>
+                  </m:oMath>
+                </a14:m>
+                <a:r>
+                  <a:rPr lang="en-US" dirty="0" smtClean="0">
+                    <a:latin typeface="Cambria Math" charset="0"/>
+                    <a:ea typeface="Cambria Math" charset="0"/>
+                    <a:cs typeface="Cambria Math" charset="0"/>
+                  </a:rPr>
+                  <a:t>=3</a:t>
+                </a:r>
+                <a:endParaRPr lang="en-US" dirty="0">
+                  <a:latin typeface="Cambria Math" charset="0"/>
+                  <a:ea typeface="Cambria Math" charset="0"/>
+                  <a:cs typeface="Cambria Math" charset="0"/>
+                </a:endParaRPr>
+              </a:p>
+            </p:txBody>
+          </p:sp>
+        </mc:Choice>
+        <mc:Fallback>
+          <p:sp>
+            <p:nvSpPr>
+              <p:cNvPr id="54" name="TextBox 53"/>
+              <p:cNvSpPr txBox="1">
+                <a:spLocks noRot="1" noChangeAspect="1" noMove="1" noResize="1" noEditPoints="1" noAdjustHandles="1" noChangeArrowheads="1" noChangeShapeType="1" noTextEdit="1"/>
+              </p:cNvSpPr>
+              <p:nvPr/>
+            </p:nvSpPr>
+            <p:spPr>
+              <a:xfrm>
+                <a:off x="6750206" y="3632090"/>
+                <a:ext cx="685800" cy="369332"/>
+              </a:xfrm>
+              <a:prstGeom prst="rect">
+                <a:avLst/>
+              </a:prstGeom>
+              <a:blipFill rotWithShape="0">
+                <a:blip r:embed="rId13"/>
+                <a:stretch>
+                  <a:fillRect t="-11667" r="-5310" b="-25000"/>
+                </a:stretch>
+              </a:blipFill>
+            </p:spPr>
+            <p:txBody>
+              <a:bodyPr/>
+              <a:lstStyle/>
+              <a:p>
+                <a:r>
+                  <a:rPr lang="en-US">
+                    <a:noFill/>
+                  </a:rPr>
+                  <a:t> </a:t>
+                </a:r>
+              </a:p>
+            </p:txBody>
+          </p:sp>
+        </mc:Fallback>
+      </mc:AlternateContent>
+      <mc:AlternateContent xmlns:mc="http://schemas.openxmlformats.org/markup-compatibility/2006">
+        <mc:Choice xmlns:a14="http://schemas.microsoft.com/office/drawing/2010/main" Requires="a14">
+          <p:sp>
+            <p:nvSpPr>
+              <p:cNvPr id="55" name="TextBox 54"/>
+              <p:cNvSpPr txBox="1"/>
+              <p:nvPr/>
+            </p:nvSpPr>
+            <p:spPr>
+              <a:xfrm>
+                <a:off x="5982398" y="4415527"/>
+                <a:ext cx="685800" cy="369332"/>
+              </a:xfrm>
+              <a:prstGeom prst="rect">
+                <a:avLst/>
+              </a:prstGeom>
+              <a:noFill/>
+            </p:spPr>
+            <p:txBody>
+              <a:bodyPr wrap="square" rtlCol="0">
+                <a:spAutoFit/>
+              </a:bodyPr>
+              <a:lstStyle/>
+              <a:p>
+                <a:pPr algn="ctr"/>
+                <a14:m>
+                  <m:oMath xmlns:m="http://schemas.openxmlformats.org/officeDocument/2006/math">
+                    <m:sSub>
+                      <m:sSubPr>
+                        <m:ctrlPr>
+                          <a:rPr lang="en-US" b="0" i="1" smtClean="0">
+                            <a:latin typeface="Cambria Math" charset="0"/>
+                            <a:ea typeface="Cambria Math" charset="0"/>
+                            <a:cs typeface="Cambria Math" charset="0"/>
+                          </a:rPr>
+                        </m:ctrlPr>
+                      </m:sSubPr>
+                      <m:e>
+                        <m:r>
+                          <a:rPr lang="en-US" b="0" i="1" smtClean="0">
+                            <a:latin typeface="Cambria Math" charset="0"/>
+                            <a:ea typeface="Cambria Math" charset="0"/>
+                            <a:cs typeface="Cambria Math" charset="0"/>
+                          </a:rPr>
+                          <m:t>𝑙</m:t>
+                        </m:r>
+                      </m:e>
+                      <m:sub>
+                        <m:r>
+                          <a:rPr lang="en-US" b="0" i="1" smtClean="0">
+                            <a:latin typeface="Cambria Math" charset="0"/>
+                            <a:ea typeface="Cambria Math" charset="0"/>
+                            <a:cs typeface="Cambria Math" charset="0"/>
+                          </a:rPr>
+                          <m:t>4</m:t>
+                        </m:r>
+                      </m:sub>
+                    </m:sSub>
+                  </m:oMath>
+                </a14:m>
+                <a:r>
+                  <a:rPr lang="en-US" dirty="0" smtClean="0">
+                    <a:latin typeface="Cambria Math" charset="0"/>
+                    <a:ea typeface="Cambria Math" charset="0"/>
+                    <a:cs typeface="Cambria Math" charset="0"/>
+                  </a:rPr>
+                  <a:t>=3</a:t>
+                </a:r>
+                <a:endParaRPr lang="en-US" dirty="0">
+                  <a:latin typeface="Cambria Math" charset="0"/>
+                  <a:ea typeface="Cambria Math" charset="0"/>
+                  <a:cs typeface="Cambria Math" charset="0"/>
+                </a:endParaRPr>
+              </a:p>
+            </p:txBody>
+          </p:sp>
+        </mc:Choice>
+        <mc:Fallback>
+          <p:sp>
+            <p:nvSpPr>
+              <p:cNvPr id="55" name="TextBox 54"/>
+              <p:cNvSpPr txBox="1">
+                <a:spLocks noRot="1" noChangeAspect="1" noMove="1" noResize="1" noEditPoints="1" noAdjustHandles="1" noChangeArrowheads="1" noChangeShapeType="1" noTextEdit="1"/>
+              </p:cNvSpPr>
+              <p:nvPr/>
+            </p:nvSpPr>
+            <p:spPr>
+              <a:xfrm>
+                <a:off x="5982398" y="4415527"/>
+                <a:ext cx="685800" cy="369332"/>
+              </a:xfrm>
+              <a:prstGeom prst="rect">
+                <a:avLst/>
+              </a:prstGeom>
+              <a:blipFill rotWithShape="0">
+                <a:blip r:embed="rId14"/>
+                <a:stretch>
+                  <a:fillRect t="-9836" r="-5310" b="-22951"/>
+                </a:stretch>
+              </a:blipFill>
+            </p:spPr>
+            <p:txBody>
+              <a:bodyPr/>
+              <a:lstStyle/>
+              <a:p>
+                <a:r>
+                  <a:rPr lang="en-US">
+                    <a:noFill/>
+                  </a:rPr>
+                  <a:t> </a:t>
+                </a:r>
+              </a:p>
+            </p:txBody>
+          </p:sp>
+        </mc:Fallback>
+      </mc:AlternateContent>
     </p:spTree>
     <p:extLst>
       <p:ext uri="{BB962C8B-B14F-4D97-AF65-F5344CB8AC3E}">

</xml_diff>